<commit_message>
blue + small map symbols
</commit_message>
<xml_diff>
--- a/docs/2025-04-08 Update.pptx
+++ b/docs/2025-04-08 Update.pptx
@@ -6604,15 +6604,7 @@
           <a:p>
             <a:r>
               <a:rPr lang="en-US" dirty="0"/>
-              <a:t>Status </a:t>
-            </a:r>
-            <a:r>
-              <a:rPr lang="en-US" dirty="0" err="1"/>
-              <a:t>Mousterien</a:t>
-            </a:r>
-            <a:r>
-              <a:rPr lang="en-US" dirty="0"/>
-              <a:t>?</a:t>
+              <a:t>Review Mousterian</a:t>
             </a:r>
             <a:endParaRPr lang="en-DE" dirty="0"/>
           </a:p>
@@ -6634,14 +6626,14 @@
             <p:ph idx="1"/>
             <p:extLst>
               <p:ext uri="{D42A27DB-BD31-4B8C-83A1-F6EECF244321}">
-                <p14:modId xmlns:p14="http://schemas.microsoft.com/office/powerpoint/2010/main" val="3229340755"/>
+                <p14:modId xmlns:p14="http://schemas.microsoft.com/office/powerpoint/2010/main" val="3266989861"/>
               </p:ext>
             </p:extLst>
           </p:nvPr>
         </p:nvGraphicFramePr>
         <p:xfrm>
-          <a:off x="838200" y="1825625"/>
-          <a:ext cx="10515597" cy="3337560"/>
+          <a:off x="838200" y="3035300"/>
+          <a:ext cx="10515597" cy="3708400"/>
         </p:xfrm>
         <a:graphic>
           <a:graphicData uri="http://schemas.openxmlformats.org/drawingml/2006/table">
@@ -6707,7 +6699,7 @@
                     <a:p>
                       <a:pPr algn="l" fontAlgn="b"/>
                       <a:r>
-                        <a:rPr lang="de-DE" sz="1100" b="1" i="0" u="none" strike="noStrike">
+                        <a:rPr lang="de-DE" sz="1100" b="1" i="0" u="none" strike="noStrike" dirty="0" err="1">
                           <a:solidFill>
                             <a:srgbClr val="000000"/>
                           </a:solidFill>
@@ -6715,26 +6707,6 @@
                           <a:latin typeface="Calibri" panose="020F0502020204030204" pitchFamily="34" charset="0"/>
                         </a:rPr>
                         <a:t>idarchstrat</a:t>
-                      </a:r>
-                    </a:p>
-                  </a:txBody>
-                  <a:tcPr marL="9525" marR="9525" marT="9525" marB="0" anchor="b"/>
-                </a:tc>
-                <a:tc>
-                  <a:txBody>
-                    <a:bodyPr/>
-                    <a:lstStyle/>
-                    <a:p>
-                      <a:pPr algn="l" fontAlgn="b"/>
-                      <a:r>
-                        <a:rPr lang="de-DE" sz="1100" b="1" i="0" u="none" strike="noStrike" dirty="0" err="1">
-                          <a:solidFill>
-                            <a:srgbClr val="000000"/>
-                          </a:solidFill>
-                          <a:effectLst/>
-                          <a:latin typeface="Calibri" panose="020F0502020204030204" pitchFamily="34" charset="0"/>
-                        </a:rPr>
-                        <a:t>technocomplex</a:t>
                       </a:r>
                       <a:endParaRPr lang="de-DE" sz="1100" b="1" i="0" u="none" strike="noStrike" dirty="0">
                         <a:solidFill>
@@ -6747,6 +6719,33 @@
                   </a:txBody>
                   <a:tcPr marL="9525" marR="9525" marT="9525" marB="0" anchor="b"/>
                 </a:tc>
+                <a:tc>
+                  <a:txBody>
+                    <a:bodyPr/>
+                    <a:lstStyle/>
+                    <a:p>
+                      <a:pPr algn="l" fontAlgn="b"/>
+                      <a:r>
+                        <a:rPr lang="de-DE" sz="1100" b="1" i="0" u="none" strike="noStrike" dirty="0" err="1">
+                          <a:solidFill>
+                            <a:srgbClr val="000000"/>
+                          </a:solidFill>
+                          <a:effectLst/>
+                          <a:latin typeface="Calibri" panose="020F0502020204030204" pitchFamily="34" charset="0"/>
+                        </a:rPr>
+                        <a:t>technocomplex</a:t>
+                      </a:r>
+                      <a:endParaRPr lang="de-DE" sz="1100" b="1" i="0" u="none" strike="noStrike" dirty="0">
+                        <a:solidFill>
+                          <a:srgbClr val="000000"/>
+                        </a:solidFill>
+                        <a:effectLst/>
+                        <a:latin typeface="Calibri" panose="020F0502020204030204" pitchFamily="34" charset="0"/>
+                      </a:endParaRPr>
+                    </a:p>
+                  </a:txBody>
+                  <a:tcPr marL="9525" marR="9525" marT="9525" marB="0" anchor="b"/>
+                </a:tc>
                 <a:extLst>
                   <a:ext uri="{0D108BD9-81ED-4DB2-BD59-A6C34878D82A}">
                     <a16:rowId xmlns:a16="http://schemas.microsoft.com/office/drawing/2014/main" val="2477186648"/>
@@ -7029,14 +7028,34 @@
                     <a:p>
                       <a:pPr algn="l" fontAlgn="b"/>
                       <a:r>
-                        <a:rPr lang="de-DE" sz="1100" b="0" i="0" u="none" strike="noStrike">
-                          <a:solidFill>
-                            <a:srgbClr val="000000"/>
-                          </a:solidFill>
-                          <a:effectLst/>
-                          <a:latin typeface="Calibri" panose="020F0502020204030204" pitchFamily="34" charset="0"/>
-                        </a:rPr>
-                        <a:t>Middle Levalloiso-Mousterian - Levant</a:t>
+                        <a:rPr lang="de-DE" sz="1100" b="0" i="0" u="none" strike="noStrike" dirty="0">
+                          <a:solidFill>
+                            <a:srgbClr val="000000"/>
+                          </a:solidFill>
+                          <a:effectLst/>
+                          <a:latin typeface="Calibri" panose="020F0502020204030204" pitchFamily="34" charset="0"/>
+                        </a:rPr>
+                        <a:t>Middle </a:t>
+                      </a:r>
+                      <a:r>
+                        <a:rPr lang="de-DE" sz="1100" b="0" i="0" u="none" strike="noStrike" dirty="0" err="1">
+                          <a:solidFill>
+                            <a:srgbClr val="000000"/>
+                          </a:solidFill>
+                          <a:effectLst/>
+                          <a:latin typeface="Calibri" panose="020F0502020204030204" pitchFamily="34" charset="0"/>
+                        </a:rPr>
+                        <a:t>Levalloiso-Mousterian</a:t>
+                      </a:r>
+                      <a:r>
+                        <a:rPr lang="de-DE" sz="1100" b="0" i="0" u="none" strike="noStrike" dirty="0">
+                          <a:solidFill>
+                            <a:srgbClr val="000000"/>
+                          </a:solidFill>
+                          <a:effectLst/>
+                          <a:latin typeface="Calibri" panose="020F0502020204030204" pitchFamily="34" charset="0"/>
+                        </a:rPr>
+                        <a:t> - Levant</a:t>
                       </a:r>
                     </a:p>
                   </a:txBody>
@@ -7230,46 +7249,6 @@
                     <a:p>
                       <a:pPr algn="l" fontAlgn="b"/>
                       <a:r>
-                        <a:rPr lang="de-DE" sz="1100" b="0" i="0" u="none" strike="noStrike">
-                          <a:solidFill>
-                            <a:srgbClr val="000000"/>
-                          </a:solidFill>
-                          <a:effectLst/>
-                          <a:latin typeface="Calibri" panose="020F0502020204030204" pitchFamily="34" charset="0"/>
-                        </a:rPr>
-                        <a:t>Denticulate Mousterian</a:t>
-                      </a:r>
-                    </a:p>
-                  </a:txBody>
-                  <a:tcPr marL="9525" marR="9525" marT="9525" marB="0" anchor="b"/>
-                </a:tc>
-                <a:tc>
-                  <a:txBody>
-                    <a:bodyPr/>
-                    <a:lstStyle/>
-                    <a:p>
-                      <a:pPr algn="l" fontAlgn="b"/>
-                      <a:r>
-                        <a:rPr lang="de-DE" sz="1100" b="0" i="0" u="none" strike="noStrike">
-                          <a:solidFill>
-                            <a:srgbClr val="000000"/>
-                          </a:solidFill>
-                          <a:effectLst/>
-                          <a:latin typeface="Calibri" panose="020F0502020204030204" pitchFamily="34" charset="0"/>
-                        </a:rPr>
-                        <a:t>MP/ Denticulate Mousterian</a:t>
-                      </a:r>
-                    </a:p>
-                  </a:txBody>
-                  <a:tcPr marL="9525" marR="9525" marT="9525" marB="0" anchor="b"/>
-                </a:tc>
-                <a:tc>
-                  <a:txBody>
-                    <a:bodyPr/>
-                    <a:lstStyle/>
-                    <a:p>
-                      <a:pPr algn="l" fontAlgn="b"/>
-                      <a:r>
                         <a:rPr lang="de-DE" sz="1100" b="0" i="0" u="none" strike="noStrike" dirty="0" err="1">
                           <a:solidFill>
                             <a:srgbClr val="000000"/>
@@ -7310,9 +7289,248 @@
                   </a:txBody>
                   <a:tcPr marL="9525" marR="9525" marT="9525" marB="0" anchor="b"/>
                 </a:tc>
+                <a:tc>
+                  <a:txBody>
+                    <a:bodyPr/>
+                    <a:lstStyle/>
+                    <a:p>
+                      <a:pPr algn="l" fontAlgn="b"/>
+                      <a:r>
+                        <a:rPr lang="de-DE" sz="1100" b="0" i="0" u="none" strike="noStrike" dirty="0">
+                          <a:solidFill>
+                            <a:srgbClr val="000000"/>
+                          </a:solidFill>
+                          <a:effectLst/>
+                          <a:latin typeface="Calibri" panose="020F0502020204030204" pitchFamily="34" charset="0"/>
+                        </a:rPr>
+                        <a:t>MP/ </a:t>
+                      </a:r>
+                      <a:r>
+                        <a:rPr lang="de-DE" sz="1100" b="0" i="0" u="none" strike="noStrike" dirty="0" err="1">
+                          <a:solidFill>
+                            <a:srgbClr val="000000"/>
+                          </a:solidFill>
+                          <a:effectLst/>
+                          <a:latin typeface="Calibri" panose="020F0502020204030204" pitchFamily="34" charset="0"/>
+                        </a:rPr>
+                        <a:t>Denticulate</a:t>
+                      </a:r>
+                      <a:r>
+                        <a:rPr lang="de-DE" sz="1100" b="0" i="0" u="none" strike="noStrike" dirty="0">
+                          <a:solidFill>
+                            <a:srgbClr val="000000"/>
+                          </a:solidFill>
+                          <a:effectLst/>
+                          <a:latin typeface="Calibri" panose="020F0502020204030204" pitchFamily="34" charset="0"/>
+                        </a:rPr>
+                        <a:t> </a:t>
+                      </a:r>
+                      <a:r>
+                        <a:rPr lang="de-DE" sz="1100" b="0" i="0" u="none" strike="noStrike" dirty="0" err="1">
+                          <a:solidFill>
+                            <a:srgbClr val="000000"/>
+                          </a:solidFill>
+                          <a:effectLst/>
+                          <a:latin typeface="Calibri" panose="020F0502020204030204" pitchFamily="34" charset="0"/>
+                        </a:rPr>
+                        <a:t>Mousterian</a:t>
+                      </a:r>
+                      <a:endParaRPr lang="de-DE" sz="1100" b="0" i="0" u="none" strike="noStrike" dirty="0">
+                        <a:solidFill>
+                          <a:srgbClr val="000000"/>
+                        </a:solidFill>
+                        <a:effectLst/>
+                        <a:latin typeface="Calibri" panose="020F0502020204030204" pitchFamily="34" charset="0"/>
+                      </a:endParaRPr>
+                    </a:p>
+                  </a:txBody>
+                  <a:tcPr marL="9525" marR="9525" marT="9525" marB="0" anchor="b"/>
+                </a:tc>
+                <a:tc>
+                  <a:txBody>
+                    <a:bodyPr/>
+                    <a:lstStyle/>
+                    <a:p>
+                      <a:pPr algn="l" fontAlgn="b"/>
+                      <a:r>
+                        <a:rPr lang="de-DE" sz="1100" b="0" i="0" u="none" strike="noStrike" dirty="0" err="1">
+                          <a:solidFill>
+                            <a:srgbClr val="000000"/>
+                          </a:solidFill>
+                          <a:effectLst/>
+                          <a:latin typeface="Calibri" panose="020F0502020204030204" pitchFamily="34" charset="0"/>
+                        </a:rPr>
+                        <a:t>Denticulate</a:t>
+                      </a:r>
+                      <a:r>
+                        <a:rPr lang="de-DE" sz="1100" b="0" i="0" u="none" strike="noStrike" dirty="0">
+                          <a:solidFill>
+                            <a:srgbClr val="000000"/>
+                          </a:solidFill>
+                          <a:effectLst/>
+                          <a:latin typeface="Calibri" panose="020F0502020204030204" pitchFamily="34" charset="0"/>
+                        </a:rPr>
+                        <a:t> </a:t>
+                      </a:r>
+                      <a:r>
+                        <a:rPr lang="de-DE" sz="1100" b="0" i="0" u="none" strike="noStrike" dirty="0" err="1">
+                          <a:solidFill>
+                            <a:srgbClr val="000000"/>
+                          </a:solidFill>
+                          <a:effectLst/>
+                          <a:latin typeface="Calibri" panose="020F0502020204030204" pitchFamily="34" charset="0"/>
+                        </a:rPr>
+                        <a:t>Mousterian</a:t>
+                      </a:r>
+                      <a:endParaRPr lang="de-DE" sz="1100" b="0" i="0" u="none" strike="noStrike" dirty="0">
+                        <a:solidFill>
+                          <a:srgbClr val="000000"/>
+                        </a:solidFill>
+                        <a:effectLst/>
+                        <a:latin typeface="Calibri" panose="020F0502020204030204" pitchFamily="34" charset="0"/>
+                      </a:endParaRPr>
+                    </a:p>
+                  </a:txBody>
+                  <a:tcPr marL="9525" marR="9525" marT="9525" marB="0" anchor="b"/>
+                </a:tc>
                 <a:extLst>
                   <a:ext uri="{0D108BD9-81ED-4DB2-BD59-A6C34878D82A}">
                     <a16:rowId xmlns:a16="http://schemas.microsoft.com/office/drawing/2014/main" val="2377528478"/>
+                  </a:ext>
+                </a:extLst>
+              </a:tr>
+              <a:tr h="370840">
+                <a:tc>
+                  <a:txBody>
+                    <a:bodyPr/>
+                    <a:lstStyle/>
+                    <a:p>
+                      <a:pPr algn="l" fontAlgn="b"/>
+                      <a:r>
+                        <a:rPr lang="de-DE" sz="1100" b="0" i="0" u="none" strike="noStrike" dirty="0">
+                          <a:solidFill>
+                            <a:srgbClr val="000000"/>
+                          </a:solidFill>
+                          <a:effectLst/>
+                          <a:latin typeface="Calibri" panose="020F0502020204030204" pitchFamily="34" charset="0"/>
+                        </a:rPr>
+                        <a:t>Middle Paleolithic</a:t>
+                      </a:r>
+                    </a:p>
+                  </a:txBody>
+                  <a:tcPr marL="9525" marR="9525" marT="9525" marB="0" anchor="b"/>
+                </a:tc>
+                <a:tc>
+                  <a:txBody>
+                    <a:bodyPr/>
+                    <a:lstStyle/>
+                    <a:p>
+                      <a:pPr algn="l" fontAlgn="b"/>
+                      <a:r>
+                        <a:rPr lang="de-DE" sz="1100" b="0" i="0" u="none" strike="noStrike" dirty="0" err="1">
+                          <a:solidFill>
+                            <a:srgbClr val="000000"/>
+                          </a:solidFill>
+                          <a:effectLst/>
+                          <a:highlight>
+                            <a:srgbClr val="FF0000"/>
+                          </a:highlight>
+                          <a:latin typeface="Calibri" panose="020F0502020204030204" pitchFamily="34" charset="0"/>
+                        </a:rPr>
+                        <a:t>Mousterian</a:t>
+                      </a:r>
+                      <a:r>
+                        <a:rPr lang="de-DE" sz="1100" b="0" i="0" u="none" strike="noStrike" dirty="0">
+                          <a:solidFill>
+                            <a:srgbClr val="000000"/>
+                          </a:solidFill>
+                          <a:effectLst/>
+                          <a:highlight>
+                            <a:srgbClr val="FF0000"/>
+                          </a:highlight>
+                          <a:latin typeface="Calibri" panose="020F0502020204030204" pitchFamily="34" charset="0"/>
+                        </a:rPr>
+                        <a:t> </a:t>
+                      </a:r>
+                      <a:r>
+                        <a:rPr lang="de-DE" sz="1100" b="0" i="0" u="none" strike="noStrike" dirty="0" err="1">
+                          <a:solidFill>
+                            <a:srgbClr val="000000"/>
+                          </a:solidFill>
+                          <a:effectLst/>
+                          <a:highlight>
+                            <a:srgbClr val="FF0000"/>
+                          </a:highlight>
+                          <a:latin typeface="Calibri" panose="020F0502020204030204" pitchFamily="34" charset="0"/>
+                        </a:rPr>
+                        <a:t>of</a:t>
+                      </a:r>
+                      <a:r>
+                        <a:rPr lang="de-DE" sz="1100" b="0" i="0" u="none" strike="noStrike" dirty="0">
+                          <a:solidFill>
+                            <a:srgbClr val="000000"/>
+                          </a:solidFill>
+                          <a:effectLst/>
+                          <a:highlight>
+                            <a:srgbClr val="FF0000"/>
+                          </a:highlight>
+                          <a:latin typeface="Calibri" panose="020F0502020204030204" pitchFamily="34" charset="0"/>
+                        </a:rPr>
+                        <a:t> </a:t>
+                      </a:r>
+                      <a:r>
+                        <a:rPr lang="de-DE" sz="1100" b="0" i="0" u="none" strike="noStrike" dirty="0" err="1">
+                          <a:solidFill>
+                            <a:srgbClr val="000000"/>
+                          </a:solidFill>
+                          <a:effectLst/>
+                          <a:highlight>
+                            <a:srgbClr val="FF0000"/>
+                          </a:highlight>
+                          <a:latin typeface="Calibri" panose="020F0502020204030204" pitchFamily="34" charset="0"/>
+                        </a:rPr>
+                        <a:t>Acheulean</a:t>
+                      </a:r>
+                      <a:r>
+                        <a:rPr lang="de-DE" sz="1100" b="0" i="0" u="none" strike="noStrike" dirty="0">
+                          <a:solidFill>
+                            <a:srgbClr val="000000"/>
+                          </a:solidFill>
+                          <a:effectLst/>
+                          <a:highlight>
+                            <a:srgbClr val="FF0000"/>
+                          </a:highlight>
+                          <a:latin typeface="Calibri" panose="020F0502020204030204" pitchFamily="34" charset="0"/>
+                        </a:rPr>
+                        <a:t> Tradition</a:t>
+                      </a:r>
+                    </a:p>
+                  </a:txBody>
+                  <a:tcPr marL="9525" marR="9525" marT="9525" marB="0" anchor="b"/>
+                </a:tc>
+                <a:tc>
+                  <a:txBody>
+                    <a:bodyPr/>
+                    <a:lstStyle/>
+                    <a:p>
+                      <a:pPr algn="l" fontAlgn="b"/>
+                      <a:r>
+                        <a:rPr lang="en-US" sz="1100" b="0" i="0" u="none" strike="noStrike" dirty="0">
+                          <a:solidFill>
+                            <a:srgbClr val="000000"/>
+                          </a:solidFill>
+                          <a:effectLst/>
+                          <a:latin typeface="Calibri" panose="020F0502020204030204" pitchFamily="34" charset="0"/>
+                        </a:rPr>
+                        <a:t>MP/ Mousterian of Acheulean Tradition</a:t>
+                      </a:r>
+                    </a:p>
+                  </a:txBody>
+                  <a:tcPr marL="9525" marR="9525" marT="9525" marB="0" anchor="b"/>
+                </a:tc>
+                <a:extLst>
+                  <a:ext uri="{0D108BD9-81ED-4DB2-BD59-A6C34878D82A}">
+                    <a16:rowId xmlns:a16="http://schemas.microsoft.com/office/drawing/2014/main" val="878259372"/>
                   </a:ext>
                 </a:extLst>
               </a:tr>
@@ -7320,6 +7538,36 @@
           </a:graphicData>
         </a:graphic>
       </p:graphicFrame>
+      <p:pic>
+        <p:nvPicPr>
+          <p:cNvPr id="5" name="Picture 4">
+            <a:extLst>
+              <a:ext uri="{FF2B5EF4-FFF2-40B4-BE49-F238E27FC236}">
+                <a16:creationId xmlns:a16="http://schemas.microsoft.com/office/drawing/2014/main" id="{EED2F268-2241-43EB-F849-D7510CBF43CD}"/>
+              </a:ext>
+            </a:extLst>
+          </p:cNvPr>
+          <p:cNvPicPr>
+            <a:picLocks noChangeAspect="1"/>
+          </p:cNvPicPr>
+          <p:nvPr/>
+        </p:nvPicPr>
+        <p:blipFill>
+          <a:blip r:embed="rId2"/>
+          <a:stretch>
+            <a:fillRect/>
+          </a:stretch>
+        </p:blipFill>
+        <p:spPr>
+          <a:xfrm>
+            <a:off x="6305550" y="0"/>
+            <a:ext cx="5886450" cy="2903369"/>
+          </a:xfrm>
+          <a:prstGeom prst="rect">
+            <a:avLst/>
+          </a:prstGeom>
+        </p:spPr>
+      </p:pic>
     </p:spTree>
     <p:extLst>
       <p:ext uri="{BB962C8B-B14F-4D97-AF65-F5344CB8AC3E}">
@@ -7373,7 +7621,7 @@
           <a:p>
             <a:r>
               <a:rPr lang="en-US" dirty="0"/>
-              <a:t>Status Acheulean?</a:t>
+              <a:t>Review Acheulean</a:t>
             </a:r>
             <a:endParaRPr lang="en-DE" dirty="0"/>
           </a:p>
@@ -7395,14 +7643,14 @@
             <p:ph idx="1"/>
             <p:extLst>
               <p:ext uri="{D42A27DB-BD31-4B8C-83A1-F6EECF244321}">
-                <p14:modId xmlns:p14="http://schemas.microsoft.com/office/powerpoint/2010/main" val="2638943973"/>
+                <p14:modId xmlns:p14="http://schemas.microsoft.com/office/powerpoint/2010/main" val="3967777734"/>
               </p:ext>
             </p:extLst>
           </p:nvPr>
         </p:nvGraphicFramePr>
         <p:xfrm>
-          <a:off x="838200" y="1825625"/>
-          <a:ext cx="10515597" cy="4820920"/>
+          <a:off x="838200" y="1254125"/>
+          <a:ext cx="10515597" cy="5562600"/>
         </p:xfrm>
         <a:graphic>
           <a:graphicData uri="http://schemas.openxmlformats.org/drawingml/2006/table">
@@ -7656,7 +7904,7 @@
                     <a:p>
                       <a:pPr algn="l" fontAlgn="b"/>
                       <a:r>
-                        <a:rPr lang="de-DE" sz="1100" b="0" i="0" u="none" strike="noStrike">
+                        <a:rPr lang="de-DE" sz="1100" b="0" i="0" u="none" strike="noStrike" dirty="0">
                           <a:solidFill>
                             <a:srgbClr val="000000"/>
                           </a:solidFill>
@@ -8259,7 +8507,7 @@
                     <a:p>
                       <a:pPr algn="l" fontAlgn="b"/>
                       <a:r>
-                        <a:rPr lang="de-DE" sz="1100" b="0" i="0" u="none" strike="noStrike">
+                        <a:rPr lang="de-DE" sz="1100" b="0" i="0" u="none" strike="noStrike" dirty="0">
                           <a:solidFill>
                             <a:srgbClr val="000000"/>
                           </a:solidFill>
@@ -8279,14 +8527,34 @@
                     <a:p>
                       <a:pPr algn="l" fontAlgn="b"/>
                       <a:r>
-                        <a:rPr lang="de-DE" sz="1100" b="0" i="0" u="none" strike="noStrike">
-                          <a:solidFill>
-                            <a:srgbClr val="000000"/>
-                          </a:solidFill>
-                          <a:effectLst/>
-                          <a:latin typeface="Calibri" panose="020F0502020204030204" pitchFamily="34" charset="0"/>
-                        </a:rPr>
-                        <a:t>Late Acheulean - S Asia</a:t>
+                        <a:rPr lang="de-DE" sz="1100" b="0" i="0" u="none" strike="noStrike" dirty="0">
+                          <a:solidFill>
+                            <a:srgbClr val="000000"/>
+                          </a:solidFill>
+                          <a:effectLst/>
+                          <a:latin typeface="Calibri" panose="020F0502020204030204" pitchFamily="34" charset="0"/>
+                        </a:rPr>
+                        <a:t>Late </a:t>
+                      </a:r>
+                      <a:r>
+                        <a:rPr lang="de-DE" sz="1100" b="0" i="0" u="none" strike="noStrike" dirty="0" err="1">
+                          <a:solidFill>
+                            <a:srgbClr val="000000"/>
+                          </a:solidFill>
+                          <a:effectLst/>
+                          <a:latin typeface="Calibri" panose="020F0502020204030204" pitchFamily="34" charset="0"/>
+                        </a:rPr>
+                        <a:t>Acheulean</a:t>
+                      </a:r>
+                      <a:r>
+                        <a:rPr lang="de-DE" sz="1100" b="0" i="0" u="none" strike="noStrike" dirty="0">
+                          <a:solidFill>
+                            <a:srgbClr val="000000"/>
+                          </a:solidFill>
+                          <a:effectLst/>
+                          <a:latin typeface="Calibri" panose="020F0502020204030204" pitchFamily="34" charset="0"/>
+                        </a:rPr>
+                        <a:t> - S Asia</a:t>
                       </a:r>
                     </a:p>
                   </a:txBody>
@@ -8315,6 +8583,232 @@
                 <a:extLst>
                   <a:ext uri="{0D108BD9-81ED-4DB2-BD59-A6C34878D82A}">
                     <a16:rowId xmlns:a16="http://schemas.microsoft.com/office/drawing/2014/main" val="3704129416"/>
+                  </a:ext>
+                </a:extLst>
+              </a:tr>
+              <a:tr h="370840">
+                <a:tc>
+                  <a:txBody>
+                    <a:bodyPr/>
+                    <a:lstStyle/>
+                    <a:p>
+                      <a:pPr algn="l" fontAlgn="b"/>
+                      <a:r>
+                        <a:rPr lang="de-DE" sz="1100" b="0" i="0" u="none" strike="noStrike" dirty="0">
+                          <a:solidFill>
+                            <a:srgbClr val="000000"/>
+                          </a:solidFill>
+                          <a:effectLst/>
+                          <a:latin typeface="Calibri" panose="020F0502020204030204" pitchFamily="34" charset="0"/>
+                        </a:rPr>
+                        <a:t>Middle Paleolithic</a:t>
+                      </a:r>
+                    </a:p>
+                  </a:txBody>
+                  <a:tcPr marL="9525" marR="9525" marT="9525" marB="0" anchor="b"/>
+                </a:tc>
+                <a:tc>
+                  <a:txBody>
+                    <a:bodyPr/>
+                    <a:lstStyle/>
+                    <a:p>
+                      <a:pPr algn="l" fontAlgn="b"/>
+                      <a:r>
+                        <a:rPr lang="de-DE" sz="1100" b="0" i="0" u="none" strike="noStrike" dirty="0" err="1">
+                          <a:solidFill>
+                            <a:srgbClr val="000000"/>
+                          </a:solidFill>
+                          <a:effectLst/>
+                          <a:highlight>
+                            <a:srgbClr val="FF0000"/>
+                          </a:highlight>
+                          <a:latin typeface="Calibri" panose="020F0502020204030204" pitchFamily="34" charset="0"/>
+                        </a:rPr>
+                        <a:t>Mousterian</a:t>
+                      </a:r>
+                      <a:r>
+                        <a:rPr lang="de-DE" sz="1100" b="0" i="0" u="none" strike="noStrike" dirty="0">
+                          <a:solidFill>
+                            <a:srgbClr val="000000"/>
+                          </a:solidFill>
+                          <a:effectLst/>
+                          <a:highlight>
+                            <a:srgbClr val="FF0000"/>
+                          </a:highlight>
+                          <a:latin typeface="Calibri" panose="020F0502020204030204" pitchFamily="34" charset="0"/>
+                        </a:rPr>
+                        <a:t> </a:t>
+                      </a:r>
+                      <a:r>
+                        <a:rPr lang="de-DE" sz="1100" b="0" i="0" u="none" strike="noStrike" dirty="0" err="1">
+                          <a:solidFill>
+                            <a:srgbClr val="000000"/>
+                          </a:solidFill>
+                          <a:effectLst/>
+                          <a:highlight>
+                            <a:srgbClr val="FF0000"/>
+                          </a:highlight>
+                          <a:latin typeface="Calibri" panose="020F0502020204030204" pitchFamily="34" charset="0"/>
+                        </a:rPr>
+                        <a:t>of</a:t>
+                      </a:r>
+                      <a:r>
+                        <a:rPr lang="de-DE" sz="1100" b="0" i="0" u="none" strike="noStrike" dirty="0">
+                          <a:solidFill>
+                            <a:srgbClr val="000000"/>
+                          </a:solidFill>
+                          <a:effectLst/>
+                          <a:highlight>
+                            <a:srgbClr val="FF0000"/>
+                          </a:highlight>
+                          <a:latin typeface="Calibri" panose="020F0502020204030204" pitchFamily="34" charset="0"/>
+                        </a:rPr>
+                        <a:t> </a:t>
+                      </a:r>
+                      <a:r>
+                        <a:rPr lang="de-DE" sz="1100" b="0" i="0" u="none" strike="noStrike" dirty="0" err="1">
+                          <a:solidFill>
+                            <a:srgbClr val="000000"/>
+                          </a:solidFill>
+                          <a:effectLst/>
+                          <a:highlight>
+                            <a:srgbClr val="FF0000"/>
+                          </a:highlight>
+                          <a:latin typeface="Calibri" panose="020F0502020204030204" pitchFamily="34" charset="0"/>
+                        </a:rPr>
+                        <a:t>Acheulean</a:t>
+                      </a:r>
+                      <a:r>
+                        <a:rPr lang="de-DE" sz="1100" b="0" i="0" u="none" strike="noStrike" dirty="0">
+                          <a:solidFill>
+                            <a:srgbClr val="000000"/>
+                          </a:solidFill>
+                          <a:effectLst/>
+                          <a:highlight>
+                            <a:srgbClr val="FF0000"/>
+                          </a:highlight>
+                          <a:latin typeface="Calibri" panose="020F0502020204030204" pitchFamily="34" charset="0"/>
+                        </a:rPr>
+                        <a:t> Tradition</a:t>
+                      </a:r>
+                    </a:p>
+                  </a:txBody>
+                  <a:tcPr marL="9525" marR="9525" marT="9525" marB="0" anchor="b"/>
+                </a:tc>
+                <a:tc>
+                  <a:txBody>
+                    <a:bodyPr/>
+                    <a:lstStyle/>
+                    <a:p>
+                      <a:pPr algn="l" fontAlgn="b"/>
+                      <a:r>
+                        <a:rPr lang="en-US" sz="1100" b="0" i="0" u="none" strike="noStrike" dirty="0">
+                          <a:solidFill>
+                            <a:srgbClr val="000000"/>
+                          </a:solidFill>
+                          <a:effectLst/>
+                          <a:latin typeface="Calibri" panose="020F0502020204030204" pitchFamily="34" charset="0"/>
+                        </a:rPr>
+                        <a:t>MP/ Mousterian of Acheulean Tradition</a:t>
+                      </a:r>
+                    </a:p>
+                  </a:txBody>
+                  <a:tcPr marL="9525" marR="9525" marT="9525" marB="0" anchor="b"/>
+                </a:tc>
+                <a:extLst>
+                  <a:ext uri="{0D108BD9-81ED-4DB2-BD59-A6C34878D82A}">
+                    <a16:rowId xmlns:a16="http://schemas.microsoft.com/office/drawing/2014/main" val="860477359"/>
+                  </a:ext>
+                </a:extLst>
+              </a:tr>
+              <a:tr h="370840">
+                <a:tc>
+                  <a:txBody>
+                    <a:bodyPr/>
+                    <a:lstStyle/>
+                    <a:p>
+                      <a:pPr algn="l" fontAlgn="b"/>
+                      <a:r>
+                        <a:rPr lang="de-DE" sz="1100" b="0" i="0" u="none" strike="noStrike" dirty="0">
+                          <a:solidFill>
+                            <a:srgbClr val="000000"/>
+                          </a:solidFill>
+                          <a:effectLst/>
+                          <a:latin typeface="Calibri" panose="020F0502020204030204" pitchFamily="34" charset="0"/>
+                        </a:rPr>
+                        <a:t>Lower Paleolithic</a:t>
+                      </a:r>
+                    </a:p>
+                  </a:txBody>
+                  <a:tcPr marL="9525" marR="9525" marT="9525" marB="0" anchor="b"/>
+                </a:tc>
+                <a:tc>
+                  <a:txBody>
+                    <a:bodyPr/>
+                    <a:lstStyle/>
+                    <a:p>
+                      <a:pPr algn="l" fontAlgn="b"/>
+                      <a:r>
+                        <a:rPr lang="de-DE" sz="1100" b="0" i="0" u="none" strike="noStrike" dirty="0" err="1">
+                          <a:solidFill>
+                            <a:schemeClr val="tx1"/>
+                          </a:solidFill>
+                          <a:effectLst/>
+                          <a:latin typeface="Calibri" panose="020F0502020204030204" pitchFamily="34" charset="0"/>
+                        </a:rPr>
+                        <a:t>Acheulo-Yabrudian</a:t>
+                      </a:r>
+                      <a:endParaRPr lang="de-DE" sz="1100" b="0" i="0" u="none" strike="noStrike" dirty="0">
+                        <a:solidFill>
+                          <a:schemeClr val="tx1"/>
+                        </a:solidFill>
+                        <a:effectLst/>
+                        <a:latin typeface="Calibri" panose="020F0502020204030204" pitchFamily="34" charset="0"/>
+                      </a:endParaRPr>
+                    </a:p>
+                  </a:txBody>
+                  <a:tcPr marL="9525" marR="9525" marT="9525" marB="0" anchor="b"/>
+                </a:tc>
+                <a:tc>
+                  <a:txBody>
+                    <a:bodyPr/>
+                    <a:lstStyle/>
+                    <a:p>
+                      <a:pPr algn="l" fontAlgn="b"/>
+                      <a:r>
+                        <a:rPr lang="de-DE" sz="1100" b="0" i="0" u="none" strike="noStrike" dirty="0">
+                          <a:solidFill>
+                            <a:schemeClr val="tx1"/>
+                          </a:solidFill>
+                          <a:effectLst/>
+                          <a:latin typeface="Calibri" panose="020F0502020204030204" pitchFamily="34" charset="0"/>
+                        </a:rPr>
+                        <a:t>LP/ </a:t>
+                      </a:r>
+                      <a:r>
+                        <a:rPr lang="de-DE" sz="1100" b="0" i="0" u="none" strike="noStrike" dirty="0" err="1">
+                          <a:solidFill>
+                            <a:schemeClr val="tx1"/>
+                          </a:solidFill>
+                          <a:effectLst/>
+                          <a:latin typeface="Calibri" panose="020F0502020204030204" pitchFamily="34" charset="0"/>
+                        </a:rPr>
+                        <a:t>Acheulo-Yabrudian</a:t>
+                      </a:r>
+                      <a:endParaRPr lang="de-DE" sz="1100" b="0" i="0" u="none" strike="noStrike" dirty="0">
+                        <a:solidFill>
+                          <a:schemeClr val="tx1"/>
+                        </a:solidFill>
+                        <a:effectLst/>
+                        <a:latin typeface="Calibri" panose="020F0502020204030204" pitchFamily="34" charset="0"/>
+                      </a:endParaRPr>
+                    </a:p>
+                  </a:txBody>
+                  <a:tcPr marL="9525" marR="9525" marT="9525" marB="0" anchor="b"/>
+                </a:tc>
+                <a:extLst>
+                  <a:ext uri="{0D108BD9-81ED-4DB2-BD59-A6C34878D82A}">
+                    <a16:rowId xmlns:a16="http://schemas.microsoft.com/office/drawing/2014/main" val="428603728"/>
                   </a:ext>
                 </a:extLst>
               </a:tr>
@@ -8322,6 +8816,36 @@
           </a:graphicData>
         </a:graphic>
       </p:graphicFrame>
+      <p:pic>
+        <p:nvPicPr>
+          <p:cNvPr id="6" name="Picture 5">
+            <a:extLst>
+              <a:ext uri="{FF2B5EF4-FFF2-40B4-BE49-F238E27FC236}">
+                <a16:creationId xmlns:a16="http://schemas.microsoft.com/office/drawing/2014/main" id="{38CD001C-6C5A-BDBC-AE1A-39A0CD2A5DC3}"/>
+              </a:ext>
+            </a:extLst>
+          </p:cNvPr>
+          <p:cNvPicPr>
+            <a:picLocks noChangeAspect="1"/>
+          </p:cNvPicPr>
+          <p:nvPr/>
+        </p:nvPicPr>
+        <p:blipFill>
+          <a:blip r:embed="rId2"/>
+          <a:stretch>
+            <a:fillRect/>
+          </a:stretch>
+        </p:blipFill>
+        <p:spPr>
+          <a:xfrm>
+            <a:off x="8220075" y="225741"/>
+            <a:ext cx="3133722" cy="1545643"/>
+          </a:xfrm>
+          <a:prstGeom prst="rect">
+            <a:avLst/>
+          </a:prstGeom>
+        </p:spPr>
+      </p:pic>
     </p:spTree>
     <p:extLst>
       <p:ext uri="{BB962C8B-B14F-4D97-AF65-F5344CB8AC3E}">

</xml_diff>